<commit_message>
changes language to 'features to add'
</commit_message>
<xml_diff>
--- a/topics/p5js/movement.pptx
+++ b/topics/p5js/movement.pptx
@@ -3938,11 +3938,7 @@
           <a:p>
             <a:r>
               <a:rPr lang="en-US" dirty="0" smtClean="0"/>
-              <a:t>Practice reading and then modifying code that you didn’t </a:t>
-            </a:r>
-            <a:r>
-              <a:rPr lang="en-US" dirty="0" smtClean="0"/>
-              <a:t>write</a:t>
+              <a:t>Practice reading and then modifying code that you didn’t write</a:t>
             </a:r>
           </a:p>
           <a:p>
@@ -4772,7 +4768,15 @@
           <a:p>
             <a:r>
               <a:rPr lang="en-US" dirty="0" smtClean="0"/>
-              <a:t>Things to do with a pair</a:t>
+              <a:t>Features to add (with </a:t>
+            </a:r>
+            <a:r>
+              <a:rPr lang="en-US" dirty="0" smtClean="0"/>
+              <a:t>a </a:t>
+            </a:r>
+            <a:r>
+              <a:rPr lang="en-US" dirty="0" smtClean="0"/>
+              <a:t>pair)</a:t>
             </a:r>
             <a:endParaRPr lang="en-US" dirty="0"/>
           </a:p>

</xml_diff>